<commit_message>
lots of new visualizations
</commit_message>
<xml_diff>
--- a/plots/Manuscript_Draft/fold_assignment/fold_assignment.pptx
+++ b/plots/Manuscript_Draft/fold_assignment/fold_assignment.pptx
@@ -104,6 +104,11 @@
       </a:defRPr>
     </a:lvl9pPr>
   </p:defaultTextStyle>
+  <p:extLst>
+    <p:ext uri="{EFAFB233-063F-42B5-8137-9DF3F51BA10A}">
+      <p15:sldGuideLst xmlns:p15="http://schemas.microsoft.com/office/powerpoint/2012/main"/>
+    </p:ext>
+  </p:extLst>
 </p:presentation>
 </file>
 
@@ -256,7 +261,7 @@
           <a:p>
             <a:fld id="{713C9D5C-D264-2E44-AC30-815DCBC063AB}" type="datetimeFigureOut">
               <a:rPr lang="en-AU" smtClean="0"/>
-              <a:t>19/3/2023</a:t>
+              <a:t>25/3/2023</a:t>
             </a:fld>
             <a:endParaRPr lang="en-AU"/>
           </a:p>
@@ -456,7 +461,7 @@
           <a:p>
             <a:fld id="{713C9D5C-D264-2E44-AC30-815DCBC063AB}" type="datetimeFigureOut">
               <a:rPr lang="en-AU" smtClean="0"/>
-              <a:t>19/3/2023</a:t>
+              <a:t>25/3/2023</a:t>
             </a:fld>
             <a:endParaRPr lang="en-AU"/>
           </a:p>
@@ -666,7 +671,7 @@
           <a:p>
             <a:fld id="{713C9D5C-D264-2E44-AC30-815DCBC063AB}" type="datetimeFigureOut">
               <a:rPr lang="en-AU" smtClean="0"/>
-              <a:t>19/3/2023</a:t>
+              <a:t>25/3/2023</a:t>
             </a:fld>
             <a:endParaRPr lang="en-AU"/>
           </a:p>
@@ -866,7 +871,7 @@
           <a:p>
             <a:fld id="{713C9D5C-D264-2E44-AC30-815DCBC063AB}" type="datetimeFigureOut">
               <a:rPr lang="en-AU" smtClean="0"/>
-              <a:t>19/3/2023</a:t>
+              <a:t>25/3/2023</a:t>
             </a:fld>
             <a:endParaRPr lang="en-AU"/>
           </a:p>
@@ -1142,7 +1147,7 @@
           <a:p>
             <a:fld id="{713C9D5C-D264-2E44-AC30-815DCBC063AB}" type="datetimeFigureOut">
               <a:rPr lang="en-AU" smtClean="0"/>
-              <a:t>19/3/2023</a:t>
+              <a:t>25/3/2023</a:t>
             </a:fld>
             <a:endParaRPr lang="en-AU"/>
           </a:p>
@@ -1410,7 +1415,7 @@
           <a:p>
             <a:fld id="{713C9D5C-D264-2E44-AC30-815DCBC063AB}" type="datetimeFigureOut">
               <a:rPr lang="en-AU" smtClean="0"/>
-              <a:t>19/3/2023</a:t>
+              <a:t>25/3/2023</a:t>
             </a:fld>
             <a:endParaRPr lang="en-AU"/>
           </a:p>
@@ -1825,7 +1830,7 @@
           <a:p>
             <a:fld id="{713C9D5C-D264-2E44-AC30-815DCBC063AB}" type="datetimeFigureOut">
               <a:rPr lang="en-AU" smtClean="0"/>
-              <a:t>19/3/2023</a:t>
+              <a:t>25/3/2023</a:t>
             </a:fld>
             <a:endParaRPr lang="en-AU"/>
           </a:p>
@@ -1967,7 +1972,7 @@
           <a:p>
             <a:fld id="{713C9D5C-D264-2E44-AC30-815DCBC063AB}" type="datetimeFigureOut">
               <a:rPr lang="en-AU" smtClean="0"/>
-              <a:t>19/3/2023</a:t>
+              <a:t>25/3/2023</a:t>
             </a:fld>
             <a:endParaRPr lang="en-AU"/>
           </a:p>
@@ -2080,7 +2085,7 @@
           <a:p>
             <a:fld id="{713C9D5C-D264-2E44-AC30-815DCBC063AB}" type="datetimeFigureOut">
               <a:rPr lang="en-AU" smtClean="0"/>
-              <a:t>19/3/2023</a:t>
+              <a:t>25/3/2023</a:t>
             </a:fld>
             <a:endParaRPr lang="en-AU"/>
           </a:p>
@@ -2393,7 +2398,7 @@
           <a:p>
             <a:fld id="{713C9D5C-D264-2E44-AC30-815DCBC063AB}" type="datetimeFigureOut">
               <a:rPr lang="en-AU" smtClean="0"/>
-              <a:t>19/3/2023</a:t>
+              <a:t>25/3/2023</a:t>
             </a:fld>
             <a:endParaRPr lang="en-AU"/>
           </a:p>
@@ -2682,7 +2687,7 @@
           <a:p>
             <a:fld id="{713C9D5C-D264-2E44-AC30-815DCBC063AB}" type="datetimeFigureOut">
               <a:rPr lang="en-AU" smtClean="0"/>
-              <a:t>19/3/2023</a:t>
+              <a:t>25/3/2023</a:t>
             </a:fld>
             <a:endParaRPr lang="en-AU"/>
           </a:p>
@@ -2925,7 +2930,7 @@
           <a:p>
             <a:fld id="{713C9D5C-D264-2E44-AC30-815DCBC063AB}" type="datetimeFigureOut">
               <a:rPr lang="en-AU" smtClean="0"/>
-              <a:t>19/3/2023</a:t>
+              <a:t>25/3/2023</a:t>
             </a:fld>
             <a:endParaRPr lang="en-AU"/>
           </a:p>
@@ -3342,50 +3347,6 @@
           <a:chExt cx="0" cy="0"/>
         </a:xfrm>
       </p:grpSpPr>
-      <p:sp>
-        <p:nvSpPr>
-          <p:cNvPr id="7" name="TextBox 6">
-            <a:extLst>
-              <a:ext uri="{FF2B5EF4-FFF2-40B4-BE49-F238E27FC236}">
-                <a16:creationId xmlns:a16="http://schemas.microsoft.com/office/drawing/2014/main" id="{EA2BE835-8549-972D-DDD9-825FE04536B6}"/>
-              </a:ext>
-            </a:extLst>
-          </p:cNvPr>
-          <p:cNvSpPr txBox="1"/>
-          <p:nvPr/>
-        </p:nvSpPr>
-        <p:spPr>
-          <a:xfrm>
-            <a:off x="43550" y="-3573"/>
-            <a:ext cx="4592478" cy="461665"/>
-          </a:xfrm>
-          <a:prstGeom prst="rect">
-            <a:avLst/>
-          </a:prstGeom>
-          <a:noFill/>
-        </p:spPr>
-        <p:txBody>
-          <a:bodyPr wrap="square">
-            <a:spAutoFit/>
-          </a:bodyPr>
-          <a:lstStyle/>
-          <a:p>
-            <a:r>
-              <a:rPr lang="en-US" sz="2400" b="1" dirty="0">
-                <a:latin typeface="Tw Cen MT" panose="020B0602020104020603" pitchFamily="34" charset="77"/>
-                <a:ea typeface="Open Sans" pitchFamily="2" charset="0"/>
-                <a:cs typeface="Open Sans" pitchFamily="2" charset="0"/>
-              </a:rPr>
-              <a:t>Figure S6</a:t>
-            </a:r>
-            <a:endParaRPr lang="en-AU" sz="2400" b="1" dirty="0">
-              <a:latin typeface="Tw Cen MT" panose="020B0602020104020603" pitchFamily="34" charset="77"/>
-              <a:ea typeface="Open Sans" pitchFamily="2" charset="0"/>
-              <a:cs typeface="Open Sans" pitchFamily="2" charset="0"/>
-            </a:endParaRPr>
-          </a:p>
-        </p:txBody>
-      </p:sp>
       <p:graphicFrame>
         <p:nvGraphicFramePr>
           <p:cNvPr id="2" name="Table 1">
@@ -3398,11 +3359,17 @@
           <p:cNvGraphicFramePr>
             <a:graphicFrameLocks noGrp="1"/>
           </p:cNvGraphicFramePr>
-          <p:nvPr/>
+          <p:nvPr>
+            <p:extLst>
+              <p:ext uri="{D42A27DB-BD31-4B8C-83A1-F6EECF244321}">
+                <p14:modId xmlns:p14="http://schemas.microsoft.com/office/powerpoint/2010/main" val="3170739403"/>
+              </p:ext>
+            </p:extLst>
+          </p:nvPr>
         </p:nvGraphicFramePr>
         <p:xfrm>
-          <a:off x="150548" y="686510"/>
-          <a:ext cx="8246500" cy="1432692"/>
+          <a:off x="150547" y="339296"/>
+          <a:ext cx="6527170" cy="1352724"/>
         </p:xfrm>
         <a:graphic>
           <a:graphicData uri="http://schemas.openxmlformats.org/drawingml/2006/table">
@@ -3411,49 +3378,42 @@
                 <a:tableStyleId>{616DA210-FB5B-4158-B5E0-FEB733F419BA}</a:tableStyleId>
               </a:tblPr>
               <a:tblGrid>
-                <a:gridCol w="813212">
+                <a:gridCol w="794948">
                   <a:extLst>
                     <a:ext uri="{9D8B030D-6E8A-4147-A177-3AD203B41FA5}">
                       <a16:colId xmlns:a16="http://schemas.microsoft.com/office/drawing/2014/main" val="4071503604"/>
                     </a:ext>
                   </a:extLst>
                 </a:gridCol>
-                <a:gridCol w="1027216">
+                <a:gridCol w="1004145">
                   <a:extLst>
                     <a:ext uri="{9D8B030D-6E8A-4147-A177-3AD203B41FA5}">
                       <a16:colId xmlns:a16="http://schemas.microsoft.com/office/drawing/2014/main" val="4233123996"/>
                     </a:ext>
                   </a:extLst>
                 </a:gridCol>
-                <a:gridCol w="962715">
+                <a:gridCol w="867787">
                   <a:extLst>
                     <a:ext uri="{9D8B030D-6E8A-4147-A177-3AD203B41FA5}">
                       <a16:colId xmlns:a16="http://schemas.microsoft.com/office/drawing/2014/main" val="1901989703"/>
                     </a:ext>
                   </a:extLst>
                 </a:gridCol>
-                <a:gridCol w="1326820">
+                <a:gridCol w="1246864">
                   <a:extLst>
                     <a:ext uri="{9D8B030D-6E8A-4147-A177-3AD203B41FA5}">
                       <a16:colId xmlns:a16="http://schemas.microsoft.com/office/drawing/2014/main" val="647177137"/>
                     </a:ext>
                   </a:extLst>
                 </a:gridCol>
-                <a:gridCol w="1326820">
-                  <a:extLst>
-                    <a:ext uri="{9D8B030D-6E8A-4147-A177-3AD203B41FA5}">
-                      <a16:colId xmlns:a16="http://schemas.microsoft.com/office/drawing/2014/main" val="2592274054"/>
-                    </a:ext>
-                  </a:extLst>
-                </a:gridCol>
-                <a:gridCol w="1326820">
+                <a:gridCol w="1296981">
                   <a:extLst>
                     <a:ext uri="{9D8B030D-6E8A-4147-A177-3AD203B41FA5}">
                       <a16:colId xmlns:a16="http://schemas.microsoft.com/office/drawing/2014/main" val="264233462"/>
                     </a:ext>
                   </a:extLst>
                 </a:gridCol>
-                <a:gridCol w="1462897">
+                <a:gridCol w="1316445">
                   <a:extLst>
                     <a:ext uri="{9D8B030D-6E8A-4147-A177-3AD203B41FA5}">
                       <a16:colId xmlns:a16="http://schemas.microsoft.com/office/drawing/2014/main" val="357010401"/>
@@ -3461,7 +3421,7 @@
                   </a:extLst>
                 </a:gridCol>
               </a:tblGrid>
-              <a:tr h="472192">
+              <a:tr h="392224">
                 <a:tc>
                   <a:txBody>
                     <a:bodyPr/>
@@ -3548,30 +3508,6 @@
                         <a:t>Mean % controls across all folds/repeats</a:t>
                       </a:r>
                       <a:endParaRPr lang="en-US" sz="1000" b="1" i="0" u="none" strike="noStrike" dirty="0">
-                        <a:solidFill>
-                          <a:srgbClr val="000000"/>
-                        </a:solidFill>
-                        <a:effectLst/>
-                        <a:latin typeface="Tw Cen MT" panose="020B0602020104020603" pitchFamily="34" charset="77"/>
-                      </a:endParaRPr>
-                    </a:p>
-                  </a:txBody>
-                  <a:tcPr marL="5357" marR="5357" marT="5357" marB="0" anchor="ctr"/>
-                </a:tc>
-                <a:tc>
-                  <a:txBody>
-                    <a:bodyPr/>
-                    <a:lstStyle/>
-                    <a:p>
-                      <a:pPr algn="ctr" fontAlgn="b"/>
-                      <a:r>
-                        <a:rPr lang="en-US" sz="1000" b="1" u="none" strike="noStrike">
-                          <a:effectLst/>
-                          <a:latin typeface="Tw Cen MT" panose="020B0602020104020603" pitchFamily="34" charset="77"/>
-                        </a:rPr>
-                        <a:t>SD % controls across all folds/repeats</a:t>
-                      </a:r>
-                      <a:endParaRPr lang="en-US" sz="1000" b="1" i="0" u="none" strike="noStrike">
                         <a:solidFill>
                           <a:srgbClr val="000000"/>
                         </a:solidFill>
@@ -3714,30 +3650,6 @@
                           <a:latin typeface="Tw Cen MT" panose="020B0602020104020603" pitchFamily="34" charset="77"/>
                         </a:rPr>
                         <a:t>71.1</a:t>
-                      </a:r>
-                      <a:endParaRPr lang="en-US" sz="1000" b="0" i="0" u="none" strike="noStrike" dirty="0">
-                        <a:solidFill>
-                          <a:srgbClr val="000000"/>
-                        </a:solidFill>
-                        <a:effectLst/>
-                        <a:latin typeface="Tw Cen MT" panose="020B0602020104020603" pitchFamily="34" charset="77"/>
-                      </a:endParaRPr>
-                    </a:p>
-                  </a:txBody>
-                  <a:tcPr marL="5357" marR="5357" marT="5357" marB="0" anchor="ctr"/>
-                </a:tc>
-                <a:tc>
-                  <a:txBody>
-                    <a:bodyPr/>
-                    <a:lstStyle/>
-                    <a:p>
-                      <a:pPr algn="ctr" fontAlgn="b"/>
-                      <a:r>
-                        <a:rPr lang="en-US" sz="1000" u="none" strike="noStrike" dirty="0">
-                          <a:effectLst/>
-                          <a:latin typeface="Tw Cen MT" panose="020B0602020104020603" pitchFamily="34" charset="77"/>
-                        </a:rPr>
-                        <a:t>2.1</a:t>
                       </a:r>
                       <a:endParaRPr lang="en-US" sz="1000" b="0" i="0" u="none" strike="noStrike" dirty="0">
                         <a:solidFill>
@@ -3912,30 +3824,6 @@
                           <a:effectLst/>
                           <a:latin typeface="Tw Cen MT" panose="020B0602020104020603" pitchFamily="34" charset="77"/>
                         </a:rPr>
-                        <a:t>1.7</a:t>
-                      </a:r>
-                      <a:endParaRPr lang="en-US" sz="1000" b="0" i="0" u="none" strike="noStrike" dirty="0">
-                        <a:solidFill>
-                          <a:srgbClr val="000000"/>
-                        </a:solidFill>
-                        <a:effectLst/>
-                        <a:latin typeface="Tw Cen MT" panose="020B0602020104020603" pitchFamily="34" charset="77"/>
-                      </a:endParaRPr>
-                    </a:p>
-                  </a:txBody>
-                  <a:tcPr marL="5357" marR="5357" marT="5357" marB="0" anchor="ctr"/>
-                </a:tc>
-                <a:tc>
-                  <a:txBody>
-                    <a:bodyPr/>
-                    <a:lstStyle/>
-                    <a:p>
-                      <a:pPr algn="ctr" fontAlgn="b"/>
-                      <a:r>
-                        <a:rPr lang="en-US" sz="1000" u="none" strike="noStrike" dirty="0">
-                          <a:effectLst/>
-                          <a:latin typeface="Tw Cen MT" panose="020B0602020104020603" pitchFamily="34" charset="77"/>
-                        </a:rPr>
                         <a:t>73.3</a:t>
                       </a:r>
                       <a:endParaRPr lang="en-US" sz="1000" b="0" i="0" u="none" strike="noStrike" dirty="0">
@@ -4087,7 +3975,7 @@
                           <a:effectLst/>
                           <a:latin typeface="Tw Cen MT" panose="020B0602020104020603" pitchFamily="34" charset="77"/>
                         </a:rPr>
-                        <a:t>1.7</a:t>
+                        <a:t>68.8</a:t>
                       </a:r>
                       <a:endParaRPr lang="en-US" sz="1000" b="0" i="0" u="none" strike="noStrike" dirty="0">
                         <a:solidFill>
@@ -4111,33 +3999,9 @@
                           <a:effectLst/>
                           <a:latin typeface="Tw Cen MT" panose="020B0602020104020603" pitchFamily="34" charset="77"/>
                         </a:rPr>
-                        <a:t>68.8</a:t>
+                        <a:t>75</a:t>
                       </a:r>
                       <a:endParaRPr lang="en-US" sz="1000" b="0" i="0" u="none" strike="noStrike" dirty="0">
-                        <a:solidFill>
-                          <a:srgbClr val="000000"/>
-                        </a:solidFill>
-                        <a:effectLst/>
-                        <a:latin typeface="Tw Cen MT" panose="020B0602020104020603" pitchFamily="34" charset="77"/>
-                      </a:endParaRPr>
-                    </a:p>
-                  </a:txBody>
-                  <a:tcPr marL="5357" marR="5357" marT="5357" marB="0" anchor="ctr"/>
-                </a:tc>
-                <a:tc>
-                  <a:txBody>
-                    <a:bodyPr/>
-                    <a:lstStyle/>
-                    <a:p>
-                      <a:pPr algn="ctr" fontAlgn="b"/>
-                      <a:r>
-                        <a:rPr lang="en-US" sz="1000" u="none" strike="noStrike">
-                          <a:effectLst/>
-                          <a:latin typeface="Tw Cen MT" panose="020B0602020104020603" pitchFamily="34" charset="77"/>
-                        </a:rPr>
-                        <a:t>75</a:t>
-                      </a:r>
-                      <a:endParaRPr lang="en-US" sz="1000" b="0" i="0" u="none" strike="noStrike">
                         <a:solidFill>
                           <a:srgbClr val="000000"/>
                         </a:solidFill>
@@ -4258,30 +4122,6 @@
                     <a:p>
                       <a:pPr algn="ctr" fontAlgn="b"/>
                       <a:r>
-                        <a:rPr lang="en-US" sz="1000" u="none" strike="noStrike">
-                          <a:effectLst/>
-                          <a:latin typeface="Tw Cen MT" panose="020B0602020104020603" pitchFamily="34" charset="77"/>
-                        </a:rPr>
-                        <a:t>0.3</a:t>
-                      </a:r>
-                      <a:endParaRPr lang="en-US" sz="1000" b="0" i="0" u="none" strike="noStrike">
-                        <a:solidFill>
-                          <a:srgbClr val="000000"/>
-                        </a:solidFill>
-                        <a:effectLst/>
-                        <a:latin typeface="Tw Cen MT" panose="020B0602020104020603" pitchFamily="34" charset="77"/>
-                      </a:endParaRPr>
-                    </a:p>
-                  </a:txBody>
-                  <a:tcPr marL="5357" marR="5357" marT="5357" marB="0" anchor="ctr"/>
-                </a:tc>
-                <a:tc>
-                  <a:txBody>
-                    <a:bodyPr/>
-                    <a:lstStyle/>
-                    <a:p>
-                      <a:pPr algn="ctr" fontAlgn="b"/>
-                      <a:r>
                         <a:rPr lang="en-US" sz="1000" u="none" strike="noStrike" dirty="0">
                           <a:effectLst/>
                           <a:latin typeface="Tw Cen MT" panose="020B0602020104020603" pitchFamily="34" charset="77"/>
@@ -4347,7 +4187,7 @@
         </p:nvSpPr>
         <p:spPr>
           <a:xfrm>
-            <a:off x="150547" y="414865"/>
+            <a:off x="150547" y="0"/>
             <a:ext cx="3750390" cy="334707"/>
           </a:xfrm>
           <a:prstGeom prst="rect">
@@ -4391,7 +4231,7 @@
         </p:nvGrpSpPr>
         <p:grpSpPr>
           <a:xfrm>
-            <a:off x="150547" y="2243710"/>
+            <a:off x="150547" y="1887576"/>
             <a:ext cx="6527170" cy="4450836"/>
             <a:chOff x="267586" y="3989339"/>
             <a:chExt cx="8844181" cy="6030791"/>
@@ -4470,7 +4310,7 @@
         </p:nvSpPr>
         <p:spPr>
           <a:xfrm>
-            <a:off x="150547" y="2191176"/>
+            <a:off x="150547" y="1835042"/>
             <a:ext cx="3750390" cy="334707"/>
           </a:xfrm>
           <a:prstGeom prst="rect">
@@ -4514,7 +4354,7 @@
         </p:nvSpPr>
         <p:spPr>
           <a:xfrm>
-            <a:off x="4273798" y="2191176"/>
+            <a:off x="4273798" y="1835042"/>
             <a:ext cx="3750390" cy="334707"/>
           </a:xfrm>
           <a:prstGeom prst="rect">

</xml_diff>